<commit_message>
fixes for readme and initial project
</commit_message>
<xml_diff>
--- a/React - Redux with Hooks.pptx
+++ b/React - Redux with Hooks.pptx
@@ -118,6 +118,11 @@
       </a:defRPr>
     </a:lvl9pPr>
   </p:defaultTextStyle>
+  <p:extLst>
+    <p:ext uri="{EFAFB233-063F-42B5-8137-9DF3F51BA10A}">
+      <p15:sldGuideLst xmlns:p15="http://schemas.microsoft.com/office/powerpoint/2012/main"/>
+    </p:ext>
+  </p:extLst>
 </p:presentation>
 </file>
 
@@ -667,7 +672,7 @@
           <a:p>
             <a:fld id="{7CF9FAEB-4AD6-4364-B8B1-C87D190B56A4}" type="datetimeFigureOut">
               <a:rPr lang="en-US" smtClean="0"/>
-              <a:t>1/9/2020</a:t>
+              <a:t>1/20/2020</a:t>
             </a:fld>
             <a:endParaRPr lang="en-US"/>
           </a:p>
@@ -865,7 +870,7 @@
           <a:p>
             <a:fld id="{7CF9FAEB-4AD6-4364-B8B1-C87D190B56A4}" type="datetimeFigureOut">
               <a:rPr lang="en-US" smtClean="0"/>
-              <a:t>1/9/2020</a:t>
+              <a:t>1/20/2020</a:t>
             </a:fld>
             <a:endParaRPr lang="en-US"/>
           </a:p>
@@ -1073,7 +1078,7 @@
           <a:p>
             <a:fld id="{7CF9FAEB-4AD6-4364-B8B1-C87D190B56A4}" type="datetimeFigureOut">
               <a:rPr lang="en-US" smtClean="0"/>
-              <a:t>1/9/2020</a:t>
+              <a:t>1/20/2020</a:t>
             </a:fld>
             <a:endParaRPr lang="en-US"/>
           </a:p>
@@ -1271,7 +1276,7 @@
           <a:p>
             <a:fld id="{7CF9FAEB-4AD6-4364-B8B1-C87D190B56A4}" type="datetimeFigureOut">
               <a:rPr lang="en-US" smtClean="0"/>
-              <a:t>1/9/2020</a:t>
+              <a:t>1/20/2020</a:t>
             </a:fld>
             <a:endParaRPr lang="en-US"/>
           </a:p>
@@ -1546,7 +1551,7 @@
           <a:p>
             <a:fld id="{7CF9FAEB-4AD6-4364-B8B1-C87D190B56A4}" type="datetimeFigureOut">
               <a:rPr lang="en-US" smtClean="0"/>
-              <a:t>1/9/2020</a:t>
+              <a:t>1/20/2020</a:t>
             </a:fld>
             <a:endParaRPr lang="en-US"/>
           </a:p>
@@ -1811,7 +1816,7 @@
           <a:p>
             <a:fld id="{7CF9FAEB-4AD6-4364-B8B1-C87D190B56A4}" type="datetimeFigureOut">
               <a:rPr lang="en-US" smtClean="0"/>
-              <a:t>1/9/2020</a:t>
+              <a:t>1/20/2020</a:t>
             </a:fld>
             <a:endParaRPr lang="en-US"/>
           </a:p>
@@ -2223,7 +2228,7 @@
           <a:p>
             <a:fld id="{7CF9FAEB-4AD6-4364-B8B1-C87D190B56A4}" type="datetimeFigureOut">
               <a:rPr lang="en-US" smtClean="0"/>
-              <a:t>1/9/2020</a:t>
+              <a:t>1/20/2020</a:t>
             </a:fld>
             <a:endParaRPr lang="en-US"/>
           </a:p>
@@ -2364,7 +2369,7 @@
           <a:p>
             <a:fld id="{7CF9FAEB-4AD6-4364-B8B1-C87D190B56A4}" type="datetimeFigureOut">
               <a:rPr lang="en-US" smtClean="0"/>
-              <a:t>1/9/2020</a:t>
+              <a:t>1/20/2020</a:t>
             </a:fld>
             <a:endParaRPr lang="en-US"/>
           </a:p>
@@ -2477,7 +2482,7 @@
           <a:p>
             <a:fld id="{7CF9FAEB-4AD6-4364-B8B1-C87D190B56A4}" type="datetimeFigureOut">
               <a:rPr lang="en-US" smtClean="0"/>
-              <a:t>1/9/2020</a:t>
+              <a:t>1/20/2020</a:t>
             </a:fld>
             <a:endParaRPr lang="en-US"/>
           </a:p>
@@ -2788,7 +2793,7 @@
           <a:p>
             <a:fld id="{7CF9FAEB-4AD6-4364-B8B1-C87D190B56A4}" type="datetimeFigureOut">
               <a:rPr lang="en-US" smtClean="0"/>
-              <a:t>1/9/2020</a:t>
+              <a:t>1/20/2020</a:t>
             </a:fld>
             <a:endParaRPr lang="en-US"/>
           </a:p>
@@ -3076,7 +3081,7 @@
           <a:p>
             <a:fld id="{7CF9FAEB-4AD6-4364-B8B1-C87D190B56A4}" type="datetimeFigureOut">
               <a:rPr lang="en-US" smtClean="0"/>
-              <a:t>1/9/2020</a:t>
+              <a:t>1/20/2020</a:t>
             </a:fld>
             <a:endParaRPr lang="en-US"/>
           </a:p>
@@ -3317,7 +3322,7 @@
           <a:p>
             <a:fld id="{7CF9FAEB-4AD6-4364-B8B1-C87D190B56A4}" type="datetimeFigureOut">
               <a:rPr lang="en-US" smtClean="0"/>
-              <a:t>1/9/2020</a:t>
+              <a:t>1/20/2020</a:t>
             </a:fld>
             <a:endParaRPr lang="en-US"/>
           </a:p>
@@ -4128,96 +4133,6 @@
           </a:p>
         </p:txBody>
       </p:sp>
-      <p:pic>
-        <p:nvPicPr>
-          <p:cNvPr id="4" name="Picture 3">
-            <a:extLst>
-              <a:ext uri="{FF2B5EF4-FFF2-40B4-BE49-F238E27FC236}">
-                <a16:creationId xmlns:a16="http://schemas.microsoft.com/office/drawing/2014/main" id="{3D1F2ED1-F8AC-4C6A-B6AC-27A50427F70F}"/>
-              </a:ext>
-            </a:extLst>
-          </p:cNvPr>
-          <p:cNvPicPr>
-            <a:picLocks noChangeAspect="1"/>
-          </p:cNvPicPr>
-          <p:nvPr/>
-        </p:nvPicPr>
-        <p:blipFill>
-          <a:blip r:embed="rId2"/>
-          <a:stretch>
-            <a:fillRect/>
-          </a:stretch>
-        </p:blipFill>
-        <p:spPr>
-          <a:xfrm>
-            <a:off x="266700" y="1258094"/>
-            <a:ext cx="5504926" cy="944473"/>
-          </a:xfrm>
-          <a:prstGeom prst="rect">
-            <a:avLst/>
-          </a:prstGeom>
-        </p:spPr>
-      </p:pic>
-      <p:pic>
-        <p:nvPicPr>
-          <p:cNvPr id="5" name="Picture 4">
-            <a:extLst>
-              <a:ext uri="{FF2B5EF4-FFF2-40B4-BE49-F238E27FC236}">
-                <a16:creationId xmlns:a16="http://schemas.microsoft.com/office/drawing/2014/main" id="{ECDF8097-C874-42B2-86F6-35C5A5EEA7C5}"/>
-              </a:ext>
-            </a:extLst>
-          </p:cNvPr>
-          <p:cNvPicPr>
-            <a:picLocks noChangeAspect="1"/>
-          </p:cNvPicPr>
-          <p:nvPr/>
-        </p:nvPicPr>
-        <p:blipFill>
-          <a:blip r:embed="rId3"/>
-          <a:stretch>
-            <a:fillRect/>
-          </a:stretch>
-        </p:blipFill>
-        <p:spPr>
-          <a:xfrm>
-            <a:off x="6095999" y="1234280"/>
-            <a:ext cx="5903538" cy="4919615"/>
-          </a:xfrm>
-          <a:prstGeom prst="rect">
-            <a:avLst/>
-          </a:prstGeom>
-        </p:spPr>
-      </p:pic>
-      <p:pic>
-        <p:nvPicPr>
-          <p:cNvPr id="6" name="Picture 5">
-            <a:extLst>
-              <a:ext uri="{FF2B5EF4-FFF2-40B4-BE49-F238E27FC236}">
-                <a16:creationId xmlns:a16="http://schemas.microsoft.com/office/drawing/2014/main" id="{82BC3934-4521-486F-B252-31815748E464}"/>
-              </a:ext>
-            </a:extLst>
-          </p:cNvPr>
-          <p:cNvPicPr>
-            <a:picLocks noChangeAspect="1"/>
-          </p:cNvPicPr>
-          <p:nvPr/>
-        </p:nvPicPr>
-        <p:blipFill>
-          <a:blip r:embed="rId4"/>
-          <a:stretch>
-            <a:fillRect/>
-          </a:stretch>
-        </p:blipFill>
-        <p:spPr>
-          <a:xfrm>
-            <a:off x="266700" y="3201145"/>
-            <a:ext cx="4086225" cy="2952750"/>
-          </a:xfrm>
-          <a:prstGeom prst="rect">
-            <a:avLst/>
-          </a:prstGeom>
-        </p:spPr>
-      </p:pic>
       <p:sp>
         <p:nvSpPr>
           <p:cNvPr id="7" name="Content Placeholder 2">
@@ -4624,6 +4539,96 @@
           </a:p>
         </p:txBody>
       </p:sp>
+      <p:pic>
+        <p:nvPicPr>
+          <p:cNvPr id="2" name="Picture 1">
+            <a:extLst>
+              <a:ext uri="{FF2B5EF4-FFF2-40B4-BE49-F238E27FC236}">
+                <a16:creationId xmlns:a16="http://schemas.microsoft.com/office/drawing/2014/main" id="{DFFE626B-B2C4-4591-9D95-A7A478A3704D}"/>
+              </a:ext>
+            </a:extLst>
+          </p:cNvPr>
+          <p:cNvPicPr>
+            <a:picLocks noChangeAspect="1"/>
+          </p:cNvPicPr>
+          <p:nvPr/>
+        </p:nvPicPr>
+        <p:blipFill>
+          <a:blip r:embed="rId2"/>
+          <a:stretch>
+            <a:fillRect/>
+          </a:stretch>
+        </p:blipFill>
+        <p:spPr>
+          <a:xfrm>
+            <a:off x="266700" y="1401515"/>
+            <a:ext cx="5506218" cy="943107"/>
+          </a:xfrm>
+          <a:prstGeom prst="rect">
+            <a:avLst/>
+          </a:prstGeom>
+        </p:spPr>
+      </p:pic>
+      <p:pic>
+        <p:nvPicPr>
+          <p:cNvPr id="9" name="Picture 8">
+            <a:extLst>
+              <a:ext uri="{FF2B5EF4-FFF2-40B4-BE49-F238E27FC236}">
+                <a16:creationId xmlns:a16="http://schemas.microsoft.com/office/drawing/2014/main" id="{D83D485C-FBB6-4D61-A070-45F0A68A1C41}"/>
+              </a:ext>
+            </a:extLst>
+          </p:cNvPr>
+          <p:cNvPicPr>
+            <a:picLocks noChangeAspect="1"/>
+          </p:cNvPicPr>
+          <p:nvPr/>
+        </p:nvPicPr>
+        <p:blipFill>
+          <a:blip r:embed="rId3"/>
+          <a:stretch>
+            <a:fillRect/>
+          </a:stretch>
+        </p:blipFill>
+        <p:spPr>
+          <a:xfrm>
+            <a:off x="266700" y="3369365"/>
+            <a:ext cx="4086795" cy="2953162"/>
+          </a:xfrm>
+          <a:prstGeom prst="rect">
+            <a:avLst/>
+          </a:prstGeom>
+        </p:spPr>
+      </p:pic>
+      <p:pic>
+        <p:nvPicPr>
+          <p:cNvPr id="11" name="Picture 10">
+            <a:extLst>
+              <a:ext uri="{FF2B5EF4-FFF2-40B4-BE49-F238E27FC236}">
+                <a16:creationId xmlns:a16="http://schemas.microsoft.com/office/drawing/2014/main" id="{564C809D-B576-4379-A94E-1D496AF12228}"/>
+              </a:ext>
+            </a:extLst>
+          </p:cNvPr>
+          <p:cNvPicPr>
+            <a:picLocks noChangeAspect="1"/>
+          </p:cNvPicPr>
+          <p:nvPr/>
+        </p:nvPicPr>
+        <p:blipFill>
+          <a:blip r:embed="rId4"/>
+          <a:stretch>
+            <a:fillRect/>
+          </a:stretch>
+        </p:blipFill>
+        <p:spPr>
+          <a:xfrm>
+            <a:off x="6122562" y="1322002"/>
+            <a:ext cx="6069438" cy="4456043"/>
+          </a:xfrm>
+          <a:prstGeom prst="rect">
+            <a:avLst/>
+          </a:prstGeom>
+        </p:spPr>
+      </p:pic>
     </p:spTree>
     <p:extLst>
       <p:ext uri="{BB962C8B-B14F-4D97-AF65-F5344CB8AC3E}">
@@ -4826,10 +4831,10 @@
       </p:sp>
       <p:pic>
         <p:nvPicPr>
-          <p:cNvPr id="10" name="Picture 9">
-            <a:extLst>
-              <a:ext uri="{FF2B5EF4-FFF2-40B4-BE49-F238E27FC236}">
-                <a16:creationId xmlns:a16="http://schemas.microsoft.com/office/drawing/2014/main" id="{0C99DB43-54EE-43FA-B899-DD6CBB8FB927}"/>
+          <p:cNvPr id="3" name="Picture 2">
+            <a:extLst>
+              <a:ext uri="{FF2B5EF4-FFF2-40B4-BE49-F238E27FC236}">
+                <a16:creationId xmlns:a16="http://schemas.microsoft.com/office/drawing/2014/main" id="{388C1F6B-2DF6-4692-80A7-512CA5608D33}"/>
               </a:ext>
             </a:extLst>
           </p:cNvPr>
@@ -4846,20 +4851,27 @@
         </p:blipFill>
         <p:spPr>
           <a:xfrm>
-            <a:off x="187660" y="1874311"/>
-            <a:ext cx="5715838" cy="4333576"/>
+            <a:off x="434629" y="1874311"/>
+            <a:ext cx="5511563" cy="3840689"/>
           </a:xfrm>
           <a:prstGeom prst="rect">
             <a:avLst/>
           </a:prstGeom>
+          <a:effectLst>
+            <a:outerShdw blurRad="50800" dist="38100" dir="2700000" algn="tl" rotWithShape="0">
+              <a:prstClr val="black">
+                <a:alpha val="40000"/>
+              </a:prstClr>
+            </a:outerShdw>
+          </a:effectLst>
         </p:spPr>
       </p:pic>
       <p:pic>
         <p:nvPicPr>
-          <p:cNvPr id="11" name="Picture 10">
-            <a:extLst>
-              <a:ext uri="{FF2B5EF4-FFF2-40B4-BE49-F238E27FC236}">
-                <a16:creationId xmlns:a16="http://schemas.microsoft.com/office/drawing/2014/main" id="{7B4A6DCC-0436-41C7-8594-6802D619EED1}"/>
+          <p:cNvPr id="4" name="Picture 3">
+            <a:extLst>
+              <a:ext uri="{FF2B5EF4-FFF2-40B4-BE49-F238E27FC236}">
+                <a16:creationId xmlns:a16="http://schemas.microsoft.com/office/drawing/2014/main" id="{D721AB1D-097C-429F-9C7D-498913475F65}"/>
               </a:ext>
             </a:extLst>
           </p:cNvPr>
@@ -4876,12 +4888,19 @@
         </p:blipFill>
         <p:spPr>
           <a:xfrm>
-            <a:off x="6198984" y="1874311"/>
-            <a:ext cx="5805356" cy="4333576"/>
+            <a:off x="6384235" y="1874311"/>
+            <a:ext cx="5486400" cy="4038600"/>
           </a:xfrm>
           <a:prstGeom prst="rect">
             <a:avLst/>
           </a:prstGeom>
+          <a:effectLst>
+            <a:outerShdw blurRad="50800" dist="38100" dir="2700000" algn="tl" rotWithShape="0">
+              <a:prstClr val="black">
+                <a:alpha val="40000"/>
+              </a:prstClr>
+            </a:outerShdw>
+          </a:effectLst>
         </p:spPr>
       </p:pic>
     </p:spTree>
@@ -5001,10 +5020,10 @@
       </p:sp>
       <p:pic>
         <p:nvPicPr>
-          <p:cNvPr id="5" name="Picture 4">
-            <a:extLst>
-              <a:ext uri="{FF2B5EF4-FFF2-40B4-BE49-F238E27FC236}">
-                <a16:creationId xmlns:a16="http://schemas.microsoft.com/office/drawing/2014/main" id="{A4897982-F4A0-4A25-9828-9FDBBD9CD5AF}"/>
+          <p:cNvPr id="4" name="Picture 3">
+            <a:extLst>
+              <a:ext uri="{FF2B5EF4-FFF2-40B4-BE49-F238E27FC236}">
+                <a16:creationId xmlns:a16="http://schemas.microsoft.com/office/drawing/2014/main" id="{7423D04A-71CB-43D9-9F8C-60C7485B264F}"/>
               </a:ext>
             </a:extLst>
           </p:cNvPr>
@@ -5021,20 +5040,27 @@
         </p:blipFill>
         <p:spPr>
           <a:xfrm>
-            <a:off x="3590925" y="1395413"/>
-            <a:ext cx="5848350" cy="1228725"/>
+            <a:off x="3590925" y="1395052"/>
+            <a:ext cx="4936849" cy="1671999"/>
           </a:xfrm>
           <a:prstGeom prst="rect">
             <a:avLst/>
           </a:prstGeom>
+          <a:effectLst>
+            <a:outerShdw blurRad="50800" dist="38100" dir="2700000" algn="tl" rotWithShape="0">
+              <a:prstClr val="black">
+                <a:alpha val="40000"/>
+              </a:prstClr>
+            </a:outerShdw>
+          </a:effectLst>
         </p:spPr>
       </p:pic>
       <p:pic>
         <p:nvPicPr>
-          <p:cNvPr id="6" name="Picture 5">
-            <a:extLst>
-              <a:ext uri="{FF2B5EF4-FFF2-40B4-BE49-F238E27FC236}">
-                <a16:creationId xmlns:a16="http://schemas.microsoft.com/office/drawing/2014/main" id="{A30BCD0E-9739-490D-B181-E3FAD36D6A51}"/>
+          <p:cNvPr id="7" name="Picture 6">
+            <a:extLst>
+              <a:ext uri="{FF2B5EF4-FFF2-40B4-BE49-F238E27FC236}">
+                <a16:creationId xmlns:a16="http://schemas.microsoft.com/office/drawing/2014/main" id="{E9B66916-3C90-4392-9C07-C4C4581BE4FB}"/>
               </a:ext>
             </a:extLst>
           </p:cNvPr>
@@ -5051,12 +5077,19 @@
         </p:blipFill>
         <p:spPr>
           <a:xfrm>
-            <a:off x="3590925" y="3067051"/>
-            <a:ext cx="7037335" cy="3109912"/>
+            <a:off x="3590925" y="3429000"/>
+            <a:ext cx="6219825" cy="3200400"/>
           </a:xfrm>
           <a:prstGeom prst="rect">
             <a:avLst/>
           </a:prstGeom>
+          <a:effectLst>
+            <a:outerShdw blurRad="50800" dist="38100" dir="2700000" algn="tl" rotWithShape="0">
+              <a:prstClr val="black">
+                <a:alpha val="40000"/>
+              </a:prstClr>
+            </a:outerShdw>
+          </a:effectLst>
         </p:spPr>
       </p:pic>
     </p:spTree>
@@ -5546,10 +5579,10 @@
       </p:sp>
       <p:pic>
         <p:nvPicPr>
-          <p:cNvPr id="5" name="Picture 4">
-            <a:extLst>
-              <a:ext uri="{FF2B5EF4-FFF2-40B4-BE49-F238E27FC236}">
-                <a16:creationId xmlns:a16="http://schemas.microsoft.com/office/drawing/2014/main" id="{CA12D178-B227-4C99-BB47-1084A35887A7}"/>
+          <p:cNvPr id="3" name="Picture 2">
+            <a:extLst>
+              <a:ext uri="{FF2B5EF4-FFF2-40B4-BE49-F238E27FC236}">
+                <a16:creationId xmlns:a16="http://schemas.microsoft.com/office/drawing/2014/main" id="{6C51B7B9-84AD-4E86-B8FE-B40CD43CD159}"/>
               </a:ext>
             </a:extLst>
           </p:cNvPr>
@@ -5566,20 +5599,27 @@
         </p:blipFill>
         <p:spPr>
           <a:xfrm>
-            <a:off x="249153" y="1804987"/>
-            <a:ext cx="6191250" cy="3248025"/>
+            <a:off x="228600" y="1690688"/>
+            <a:ext cx="6191250" cy="3143250"/>
           </a:xfrm>
           <a:prstGeom prst="rect">
             <a:avLst/>
           </a:prstGeom>
+          <a:effectLst>
+            <a:outerShdw blurRad="50800" dist="38100" dir="2700000" algn="tl" rotWithShape="0">
+              <a:prstClr val="black">
+                <a:alpha val="40000"/>
+              </a:prstClr>
+            </a:outerShdw>
+          </a:effectLst>
         </p:spPr>
       </p:pic>
       <p:pic>
         <p:nvPicPr>
-          <p:cNvPr id="6" name="Picture 5">
-            <a:extLst>
-              <a:ext uri="{FF2B5EF4-FFF2-40B4-BE49-F238E27FC236}">
-                <a16:creationId xmlns:a16="http://schemas.microsoft.com/office/drawing/2014/main" id="{40B88FCD-1F6A-4D79-8745-DE36DECF8CEF}"/>
+          <p:cNvPr id="4" name="Picture 3">
+            <a:extLst>
+              <a:ext uri="{FF2B5EF4-FFF2-40B4-BE49-F238E27FC236}">
+                <a16:creationId xmlns:a16="http://schemas.microsoft.com/office/drawing/2014/main" id="{7AAD9CF3-FD75-43A0-AF19-EF68DF273751}"/>
               </a:ext>
             </a:extLst>
           </p:cNvPr>
@@ -5596,12 +5636,19 @@
         </p:blipFill>
         <p:spPr>
           <a:xfrm>
-            <a:off x="6627897" y="1804987"/>
-            <a:ext cx="5410200" cy="1304925"/>
+            <a:off x="6569027" y="1690688"/>
+            <a:ext cx="5534025" cy="1295400"/>
           </a:xfrm>
           <a:prstGeom prst="rect">
             <a:avLst/>
           </a:prstGeom>
+          <a:effectLst>
+            <a:outerShdw blurRad="50800" dist="38100" dir="2700000" algn="tl" rotWithShape="0">
+              <a:prstClr val="black">
+                <a:alpha val="40000"/>
+              </a:prstClr>
+            </a:outerShdw>
+          </a:effectLst>
         </p:spPr>
       </p:pic>
     </p:spTree>
@@ -5650,117 +5697,28 @@
             <p:ph type="title"/>
           </p:nvPr>
         </p:nvSpPr>
-        <p:spPr/>
-        <p:txBody>
-          <a:bodyPr/>
-          <a:lstStyle/>
-          <a:p>
-            <a:r>
-              <a:rPr lang="ru-RU" b="1" dirty="0"/>
-              <a:t>Хук эффекта</a:t>
-            </a:r>
-            <a:r>
-              <a:rPr lang="en-US" b="1" dirty="0"/>
-              <a:t> </a:t>
-            </a:r>
-            <a:r>
-              <a:rPr lang="en-US" b="1" dirty="0" err="1"/>
-              <a:t>useEffect</a:t>
-            </a:r>
-            <a:endParaRPr lang="en-US" dirty="0"/>
-          </a:p>
-        </p:txBody>
-      </p:sp>
-      <p:pic>
-        <p:nvPicPr>
-          <p:cNvPr id="4" name="Picture 3">
-            <a:extLst>
-              <a:ext uri="{FF2B5EF4-FFF2-40B4-BE49-F238E27FC236}">
-                <a16:creationId xmlns:a16="http://schemas.microsoft.com/office/drawing/2014/main" id="{8C95E61B-9582-4C0B-B91B-9DA7E2AEF935}"/>
-              </a:ext>
-            </a:extLst>
-          </p:cNvPr>
-          <p:cNvPicPr>
-            <a:picLocks noChangeAspect="1"/>
-          </p:cNvPicPr>
-          <p:nvPr/>
-        </p:nvPicPr>
-        <p:blipFill>
-          <a:blip r:embed="rId2"/>
-          <a:stretch>
-            <a:fillRect/>
-          </a:stretch>
-        </p:blipFill>
         <p:spPr>
           <a:xfrm>
-            <a:off x="1776236" y="1397000"/>
-            <a:ext cx="4214989" cy="5095875"/>
+            <a:off x="838200" y="365125"/>
+            <a:ext cx="10515600" cy="1325563"/>
           </a:xfrm>
-          <a:prstGeom prst="rect">
-            <a:avLst/>
-          </a:prstGeom>
         </p:spPr>
-      </p:pic>
-      <p:pic>
-        <p:nvPicPr>
-          <p:cNvPr id="5" name="Picture 4">
-            <a:extLst>
-              <a:ext uri="{FF2B5EF4-FFF2-40B4-BE49-F238E27FC236}">
-                <a16:creationId xmlns:a16="http://schemas.microsoft.com/office/drawing/2014/main" id="{1D9963A3-2F90-4770-ABF2-6C642CC0B33E}"/>
-              </a:ext>
-            </a:extLst>
-          </p:cNvPr>
-          <p:cNvPicPr>
-            <a:picLocks noChangeAspect="1"/>
-          </p:cNvPicPr>
-          <p:nvPr/>
-        </p:nvPicPr>
-        <p:blipFill>
-          <a:blip r:embed="rId3"/>
-          <a:stretch>
-            <a:fillRect/>
-          </a:stretch>
-        </p:blipFill>
-        <p:spPr>
-          <a:xfrm>
-            <a:off x="6281737" y="1397000"/>
-            <a:ext cx="4276725" cy="2209800"/>
-          </a:xfrm>
-          <a:prstGeom prst="rect">
-            <a:avLst/>
-          </a:prstGeom>
-        </p:spPr>
-      </p:pic>
-      <p:pic>
-        <p:nvPicPr>
-          <p:cNvPr id="6" name="Picture 5">
-            <a:extLst>
-              <a:ext uri="{FF2B5EF4-FFF2-40B4-BE49-F238E27FC236}">
-                <a16:creationId xmlns:a16="http://schemas.microsoft.com/office/drawing/2014/main" id="{7ACD7BC4-4672-4A77-A996-8247738032E4}"/>
-              </a:ext>
-            </a:extLst>
-          </p:cNvPr>
-          <p:cNvPicPr>
-            <a:picLocks noChangeAspect="1"/>
-          </p:cNvPicPr>
-          <p:nvPr/>
-        </p:nvPicPr>
-        <p:blipFill>
-          <a:blip r:embed="rId4"/>
-          <a:stretch>
-            <a:fillRect/>
-          </a:stretch>
-        </p:blipFill>
-        <p:spPr>
-          <a:xfrm>
-            <a:off x="6281737" y="4638675"/>
-            <a:ext cx="4276725" cy="1122524"/>
-          </a:xfrm>
-          <a:prstGeom prst="rect">
-            <a:avLst/>
-          </a:prstGeom>
-        </p:spPr>
-      </p:pic>
+        <p:txBody>
+          <a:bodyPr/>
+          <a:lstStyle/>
+          <a:p>
+            <a:r>
+              <a:rPr lang="ru-RU" b="1"/>
+              <a:t>Хук эффекта</a:t>
+            </a:r>
+            <a:r>
+              <a:rPr lang="en-US" b="1"/>
+              <a:t> useEffect</a:t>
+            </a:r>
+            <a:endParaRPr lang="en-US" dirty="0"/>
+          </a:p>
+        </p:txBody>
+      </p:sp>
       <p:sp>
         <p:nvSpPr>
           <p:cNvPr id="7" name="Arrow: Down 6">
@@ -5807,6 +5765,117 @@
           </a:p>
         </p:txBody>
       </p:sp>
+      <p:pic>
+        <p:nvPicPr>
+          <p:cNvPr id="3" name="Picture 2">
+            <a:extLst>
+              <a:ext uri="{FF2B5EF4-FFF2-40B4-BE49-F238E27FC236}">
+                <a16:creationId xmlns:a16="http://schemas.microsoft.com/office/drawing/2014/main" id="{EA0C992C-B219-4F5C-84BD-D65AF601E23A}"/>
+              </a:ext>
+            </a:extLst>
+          </p:cNvPr>
+          <p:cNvPicPr>
+            <a:picLocks noChangeAspect="1"/>
+          </p:cNvPicPr>
+          <p:nvPr/>
+        </p:nvPicPr>
+        <p:blipFill>
+          <a:blip r:embed="rId2"/>
+          <a:stretch>
+            <a:fillRect/>
+          </a:stretch>
+        </p:blipFill>
+        <p:spPr>
+          <a:xfrm>
+            <a:off x="1739557" y="1598612"/>
+            <a:ext cx="4200525" cy="5048250"/>
+          </a:xfrm>
+          <a:prstGeom prst="rect">
+            <a:avLst/>
+          </a:prstGeom>
+          <a:effectLst>
+            <a:outerShdw blurRad="50800" dist="38100" dir="2700000" algn="tl" rotWithShape="0">
+              <a:prstClr val="black">
+                <a:alpha val="40000"/>
+              </a:prstClr>
+            </a:outerShdw>
+          </a:effectLst>
+        </p:spPr>
+      </p:pic>
+      <p:pic>
+        <p:nvPicPr>
+          <p:cNvPr id="9" name="Picture 8">
+            <a:extLst>
+              <a:ext uri="{FF2B5EF4-FFF2-40B4-BE49-F238E27FC236}">
+                <a16:creationId xmlns:a16="http://schemas.microsoft.com/office/drawing/2014/main" id="{96A9A535-2D0A-4F2E-AB56-5D2A809264BF}"/>
+              </a:ext>
+            </a:extLst>
+          </p:cNvPr>
+          <p:cNvPicPr>
+            <a:picLocks noChangeAspect="1"/>
+          </p:cNvPicPr>
+          <p:nvPr/>
+        </p:nvPicPr>
+        <p:blipFill>
+          <a:blip r:embed="rId3"/>
+          <a:stretch>
+            <a:fillRect/>
+          </a:stretch>
+        </p:blipFill>
+        <p:spPr>
+          <a:xfrm>
+            <a:off x="6696073" y="1467402"/>
+            <a:ext cx="3448050" cy="2171700"/>
+          </a:xfrm>
+          <a:prstGeom prst="rect">
+            <a:avLst/>
+          </a:prstGeom>
+          <a:effectLst>
+            <a:outerShdw blurRad="50800" dist="38100" dir="2700000" algn="tl" rotWithShape="0">
+              <a:prstClr val="black">
+                <a:alpha val="40000"/>
+              </a:prstClr>
+            </a:outerShdw>
+          </a:effectLst>
+        </p:spPr>
+      </p:pic>
+      <p:pic>
+        <p:nvPicPr>
+          <p:cNvPr id="10" name="Picture 9">
+            <a:extLst>
+              <a:ext uri="{FF2B5EF4-FFF2-40B4-BE49-F238E27FC236}">
+                <a16:creationId xmlns:a16="http://schemas.microsoft.com/office/drawing/2014/main" id="{7B51956F-71D4-463B-AAFC-D4EF0ED255C7}"/>
+              </a:ext>
+            </a:extLst>
+          </p:cNvPr>
+          <p:cNvPicPr>
+            <a:picLocks noChangeAspect="1"/>
+          </p:cNvPicPr>
+          <p:nvPr/>
+        </p:nvPicPr>
+        <p:blipFill>
+          <a:blip r:embed="rId4"/>
+          <a:stretch>
+            <a:fillRect/>
+          </a:stretch>
+        </p:blipFill>
+        <p:spPr>
+          <a:xfrm>
+            <a:off x="6724648" y="4606373"/>
+            <a:ext cx="3419475" cy="1123950"/>
+          </a:xfrm>
+          <a:prstGeom prst="rect">
+            <a:avLst/>
+          </a:prstGeom>
+          <a:effectLst>
+            <a:outerShdw blurRad="50800" dist="38100" dir="2700000" algn="tl" rotWithShape="0">
+              <a:prstClr val="black">
+                <a:alpha val="40000"/>
+              </a:prstClr>
+            </a:outerShdw>
+          </a:effectLst>
+        </p:spPr>
+      </p:pic>
     </p:spTree>
     <p:extLst>
       <p:ext uri="{BB962C8B-B14F-4D97-AF65-F5344CB8AC3E}">
@@ -6604,6 +6673,21 @@
 </file>
 
 <file path=customXml/item1.xml><?xml version="1.0" encoding="utf-8"?>
+<p:properties xmlns:p="http://schemas.microsoft.com/office/2006/metadata/properties" xmlns:xsi="http://www.w3.org/2001/XMLSchema-instance" xmlns:pc="http://schemas.microsoft.com/office/infopath/2007/PartnerControls">
+  <documentManagement/>
+</p:properties>
+</file>
+
+<file path=customXml/item2.xml><?xml version="1.0" encoding="utf-8"?>
+<?mso-contentType ?>
+<FormTemplates xmlns="http://schemas.microsoft.com/sharepoint/v3/contenttype/forms">
+  <Display>DocumentLibraryForm</Display>
+  <Edit>DocumentLibraryForm</Edit>
+  <New>DocumentLibraryForm</New>
+</FormTemplates>
+</file>
+
+<file path=customXml/item3.xml><?xml version="1.0" encoding="utf-8"?>
 <ct:contentTypeSchema xmlns:ct="http://schemas.microsoft.com/office/2006/metadata/contentType" xmlns:ma="http://schemas.microsoft.com/office/2006/metadata/properties/metaAttributes" ct:_="" ma:_="" ma:contentTypeName="Document" ma:contentTypeID="0x0101009506CC75B57D6E4D83EC88A35B325E1C" ma:contentTypeVersion="11" ma:contentTypeDescription="Create a new document." ma:contentTypeScope="" ma:versionID="ab11620176266e48924805f4bb45d84f">
   <xsd:schema xmlns:xsd="http://www.w3.org/2001/XMLSchema" xmlns:xs="http://www.w3.org/2001/XMLSchema" xmlns:p="http://schemas.microsoft.com/office/2006/metadata/properties" xmlns:ns3="f2002a93-7bda-4cbc-8612-fb29e2446453" xmlns:ns4="e1790abd-ae67-465d-bed3-840f6d97e514" targetNamespace="http://schemas.microsoft.com/office/2006/metadata/properties" ma:root="true" ma:fieldsID="77dd7eec0c879deba95b5856a64ec636" ns3:_="" ns4:_="">
     <xsd:import namespace="f2002a93-7bda-4cbc-8612-fb29e2446453"/>
@@ -6812,22 +6896,32 @@
 </ct:contentTypeSchema>
 </file>
 
-<file path=customXml/item2.xml><?xml version="1.0" encoding="utf-8"?>
-<?mso-contentType ?>
-<FormTemplates xmlns="http://schemas.microsoft.com/sharepoint/v3/contenttype/forms">
-  <Display>DocumentLibraryForm</Display>
-  <Edit>DocumentLibraryForm</Edit>
-  <New>DocumentLibraryForm</New>
-</FormTemplates>
+<file path=customXml/itemProps1.xml><?xml version="1.0" encoding="utf-8"?>
+<ds:datastoreItem xmlns:ds="http://schemas.openxmlformats.org/officeDocument/2006/customXml" ds:itemID="{81800929-FD15-4FCE-B863-7CC612F65BDB}">
+  <ds:schemaRefs>
+    <ds:schemaRef ds:uri="http://purl.org/dc/dcmitype/"/>
+    <ds:schemaRef ds:uri="http://schemas.microsoft.com/office/2006/metadata/properties"/>
+    <ds:schemaRef ds:uri="http://schemas.microsoft.com/office/infopath/2007/PartnerControls"/>
+    <ds:schemaRef ds:uri="http://schemas.microsoft.com/office/2006/documentManagement/types"/>
+    <ds:schemaRef ds:uri="e1790abd-ae67-465d-bed3-840f6d97e514"/>
+    <ds:schemaRef ds:uri="http://purl.org/dc/elements/1.1/"/>
+    <ds:schemaRef ds:uri="http://purl.org/dc/terms/"/>
+    <ds:schemaRef ds:uri="http://schemas.openxmlformats.org/package/2006/metadata/core-properties"/>
+    <ds:schemaRef ds:uri="f2002a93-7bda-4cbc-8612-fb29e2446453"/>
+    <ds:schemaRef ds:uri="http://www.w3.org/XML/1998/namespace"/>
+  </ds:schemaRefs>
+</ds:datastoreItem>
 </file>
 
-<file path=customXml/item3.xml><?xml version="1.0" encoding="utf-8"?>
-<p:properties xmlns:p="http://schemas.microsoft.com/office/2006/metadata/properties" xmlns:xsi="http://www.w3.org/2001/XMLSchema-instance" xmlns:pc="http://schemas.microsoft.com/office/infopath/2007/PartnerControls">
-  <documentManagement/>
-</p:properties>
+<file path=customXml/itemProps2.xml><?xml version="1.0" encoding="utf-8"?>
+<ds:datastoreItem xmlns:ds="http://schemas.openxmlformats.org/officeDocument/2006/customXml" ds:itemID="{BE1E3851-0FEA-4D7D-B543-8D5F66D03BCE}">
+  <ds:schemaRefs>
+    <ds:schemaRef ds:uri="http://schemas.microsoft.com/sharepoint/v3/contenttype/forms"/>
+  </ds:schemaRefs>
+</ds:datastoreItem>
 </file>
 
-<file path=customXml/itemProps1.xml><?xml version="1.0" encoding="utf-8"?>
+<file path=customXml/itemProps3.xml><?xml version="1.0" encoding="utf-8"?>
 <ds:datastoreItem xmlns:ds="http://schemas.openxmlformats.org/officeDocument/2006/customXml" ds:itemID="{3238B1D8-D86E-4C6A-A542-4E73DE7D910F}">
   <ds:schemaRefs>
     <ds:schemaRef ds:uri="http://schemas.microsoft.com/office/2006/metadata/contentType"/>
@@ -6844,29 +6938,4 @@
     <ds:schemaRef ds:uri="http://schemas.microsoft.com/internal/obd"/>
   </ds:schemaRefs>
 </ds:datastoreItem>
-</file>
-
-<file path=customXml/itemProps2.xml><?xml version="1.0" encoding="utf-8"?>
-<ds:datastoreItem xmlns:ds="http://schemas.openxmlformats.org/officeDocument/2006/customXml" ds:itemID="{BE1E3851-0FEA-4D7D-B543-8D5F66D03BCE}">
-  <ds:schemaRefs>
-    <ds:schemaRef ds:uri="http://schemas.microsoft.com/sharepoint/v3/contenttype/forms"/>
-  </ds:schemaRefs>
-</ds:datastoreItem>
-</file>
-
-<file path=customXml/itemProps3.xml><?xml version="1.0" encoding="utf-8"?>
-<ds:datastoreItem xmlns:ds="http://schemas.openxmlformats.org/officeDocument/2006/customXml" ds:itemID="{81800929-FD15-4FCE-B863-7CC612F65BDB}">
-  <ds:schemaRefs>
-    <ds:schemaRef ds:uri="http://purl.org/dc/dcmitype/"/>
-    <ds:schemaRef ds:uri="http://schemas.microsoft.com/office/2006/metadata/properties"/>
-    <ds:schemaRef ds:uri="http://schemas.microsoft.com/office/infopath/2007/PartnerControls"/>
-    <ds:schemaRef ds:uri="http://schemas.microsoft.com/office/2006/documentManagement/types"/>
-    <ds:schemaRef ds:uri="e1790abd-ae67-465d-bed3-840f6d97e514"/>
-    <ds:schemaRef ds:uri="http://purl.org/dc/elements/1.1/"/>
-    <ds:schemaRef ds:uri="http://purl.org/dc/terms/"/>
-    <ds:schemaRef ds:uri="http://schemas.openxmlformats.org/package/2006/metadata/core-properties"/>
-    <ds:schemaRef ds:uri="f2002a93-7bda-4cbc-8612-fb29e2446453"/>
-    <ds:schemaRef ds:uri="http://www.w3.org/XML/1998/namespace"/>
-  </ds:schemaRefs>
-</ds:datastoreItem>
 </file>
</xml_diff>